<commit_message>
bugfixes - emailcertificate, pdf file for certificate, userhome dialog link to certificate, userid being email or installationid
</commit_message>
<xml_diff>
--- a/ScienceEngine-desktop/data/Electromagnetism/ElectromagnetismReview.pptx
+++ b/ScienceEngine-desktop/data/Electromagnetism/ElectromagnetismReview.pptx
@@ -246,7 +246,7 @@
       </p:pic>
       <p:pic>
         <p:nvPicPr>
-          <p:cNvPr id="12" name="Picture 11" descr="check.png"/>
+          <p:cNvPr id="14" name="Picture 13" descr="coppercoils.png"/>
           <p:cNvPicPr>
             <a:picLocks noChangeAspect="1"/>
           </p:cNvPicPr>
@@ -260,8 +260,8 @@
         </p:blipFill>
         <p:spPr>
           <a:xfrm>
-            <a:off x="2627784" y="3356992"/>
-            <a:ext cx="812698" cy="812698"/>
+            <a:off x="323528" y="188640"/>
+            <a:ext cx="720080" cy="1440160"/>
           </a:xfrm>
           <a:prstGeom prst="rect">
             <a:avLst/>
@@ -270,7 +270,7 @@
       </p:pic>
       <p:pic>
         <p:nvPicPr>
-          <p:cNvPr id="14" name="Picture 13" descr="coppercoils.png"/>
+          <p:cNvPr id="15" name="Picture 14" descr="currentsource.png"/>
           <p:cNvPicPr>
             <a:picLocks noChangeAspect="1"/>
           </p:cNvPicPr>
@@ -284,8 +284,8 @@
         </p:blipFill>
         <p:spPr>
           <a:xfrm>
-            <a:off x="323528" y="188640"/>
-            <a:ext cx="720080" cy="1440160"/>
+            <a:off x="323528" y="5232603"/>
+            <a:ext cx="812698" cy="1625397"/>
           </a:xfrm>
           <a:prstGeom prst="rect">
             <a:avLst/>
@@ -294,7 +294,7 @@
       </p:pic>
       <p:pic>
         <p:nvPicPr>
-          <p:cNvPr id="15" name="Picture 14" descr="currentsource.png"/>
+          <p:cNvPr id="16" name="Picture 15" descr="currentwire-down.png"/>
           <p:cNvPicPr>
             <a:picLocks noChangeAspect="1"/>
           </p:cNvPicPr>
@@ -308,8 +308,8 @@
         </p:blipFill>
         <p:spPr>
           <a:xfrm>
-            <a:off x="323528" y="5232603"/>
-            <a:ext cx="812698" cy="1625397"/>
+            <a:off x="8316416" y="1844824"/>
+            <a:ext cx="406349" cy="406349"/>
           </a:xfrm>
           <a:prstGeom prst="rect">
             <a:avLst/>
@@ -318,7 +318,7 @@
       </p:pic>
       <p:pic>
         <p:nvPicPr>
-          <p:cNvPr id="16" name="Picture 15" descr="currentwire-down.png"/>
+          <p:cNvPr id="17" name="Picture 16" descr="einstein.png"/>
           <p:cNvPicPr>
             <a:picLocks noChangeAspect="1"/>
           </p:cNvPicPr>
@@ -332,8 +332,8 @@
         </p:blipFill>
         <p:spPr>
           <a:xfrm>
-            <a:off x="8316416" y="1844824"/>
-            <a:ext cx="406349" cy="406349"/>
+            <a:off x="3779912" y="5445224"/>
+            <a:ext cx="1269768" cy="1269768"/>
           </a:xfrm>
           <a:prstGeom prst="rect">
             <a:avLst/>
@@ -342,7 +342,7 @@
       </p:pic>
       <p:pic>
         <p:nvPicPr>
-          <p:cNvPr id="17" name="Picture 16" descr="einstein.png"/>
+          <p:cNvPr id="18" name="Picture 17" descr="electromagnet.png"/>
           <p:cNvPicPr>
             <a:picLocks noChangeAspect="1"/>
           </p:cNvPicPr>
@@ -356,8 +356,8 @@
         </p:blipFill>
         <p:spPr>
           <a:xfrm>
-            <a:off x="3779912" y="5445224"/>
-            <a:ext cx="1269768" cy="1269768"/>
+            <a:off x="7956376" y="188640"/>
+            <a:ext cx="894193" cy="1296144"/>
           </a:xfrm>
           <a:prstGeom prst="rect">
             <a:avLst/>
@@ -366,7 +366,7 @@
       </p:pic>
       <p:pic>
         <p:nvPicPr>
-          <p:cNvPr id="18" name="Picture 17" descr="electromagnet.png"/>
+          <p:cNvPr id="20" name="Picture 19" descr="go1-down.png"/>
           <p:cNvPicPr>
             <a:picLocks noChangeAspect="1"/>
           </p:cNvPicPr>
@@ -380,8 +380,8 @@
         </p:blipFill>
         <p:spPr>
           <a:xfrm>
-            <a:off x="7956376" y="188640"/>
-            <a:ext cx="894193" cy="1296144"/>
+            <a:off x="8028384" y="5661248"/>
+            <a:ext cx="974442" cy="974442"/>
           </a:xfrm>
           <a:prstGeom prst="rect">
             <a:avLst/>
@@ -390,7 +390,7 @@
       </p:pic>
       <p:pic>
         <p:nvPicPr>
-          <p:cNvPr id="19" name="Picture 18" descr="engine.png"/>
+          <p:cNvPr id="22" name="Picture 21" descr="neodymium.png"/>
           <p:cNvPicPr>
             <a:picLocks noChangeAspect="1"/>
           </p:cNvPicPr>
@@ -404,8 +404,8 @@
         </p:blipFill>
         <p:spPr>
           <a:xfrm>
-            <a:off x="3563888" y="0"/>
-            <a:ext cx="1872208" cy="936104"/>
+            <a:off x="6660232" y="188640"/>
+            <a:ext cx="892282" cy="446141"/>
           </a:xfrm>
           <a:prstGeom prst="rect">
             <a:avLst/>
@@ -414,7 +414,7 @@
       </p:pic>
       <p:pic>
         <p:nvPicPr>
-          <p:cNvPr id="20" name="Picture 19" descr="go1-down.png"/>
+          <p:cNvPr id="24" name="Picture 23" descr="compasswip.png"/>
           <p:cNvPicPr>
             <a:picLocks noChangeAspect="1"/>
           </p:cNvPicPr>
@@ -428,8 +428,8 @@
         </p:blipFill>
         <p:spPr>
           <a:xfrm>
-            <a:off x="8028384" y="5661248"/>
-            <a:ext cx="974442" cy="974442"/>
+            <a:off x="1763688" y="5703500"/>
+            <a:ext cx="1154500" cy="1154500"/>
           </a:xfrm>
           <a:prstGeom prst="rect">
             <a:avLst/>
@@ -438,7 +438,7 @@
       </p:pic>
       <p:pic>
         <p:nvPicPr>
-          <p:cNvPr id="21" name="Picture 20" descr="greenballoon.png"/>
+          <p:cNvPr id="25" name="Picture 24" descr="horseshoemagnet.png"/>
           <p:cNvPicPr>
             <a:picLocks noChangeAspect="1"/>
           </p:cNvPicPr>
@@ -452,102 +452,6 @@
         </p:blipFill>
         <p:spPr>
           <a:xfrm>
-            <a:off x="2339752" y="116632"/>
-            <a:ext cx="1152128" cy="1152128"/>
-          </a:xfrm>
-          <a:prstGeom prst="rect">
-            <a:avLst/>
-          </a:prstGeom>
-        </p:spPr>
-      </p:pic>
-      <p:pic>
-        <p:nvPicPr>
-          <p:cNvPr id="22" name="Picture 21" descr="neodymium.png"/>
-          <p:cNvPicPr>
-            <a:picLocks noChangeAspect="1"/>
-          </p:cNvPicPr>
-          <p:nvPr userDrawn="1"/>
-        </p:nvPicPr>
-        <p:blipFill>
-          <a:blip r:embed="rId16" cstate="print"/>
-          <a:stretch>
-            <a:fillRect/>
-          </a:stretch>
-        </p:blipFill>
-        <p:spPr>
-          <a:xfrm>
-            <a:off x="6660232" y="188640"/>
-            <a:ext cx="892282" cy="446141"/>
-          </a:xfrm>
-          <a:prstGeom prst="rect">
-            <a:avLst/>
-          </a:prstGeom>
-        </p:spPr>
-      </p:pic>
-      <p:pic>
-        <p:nvPicPr>
-          <p:cNvPr id="23" name="Picture 22" descr="redballoon.png"/>
-          <p:cNvPicPr>
-            <a:picLocks noChangeAspect="1"/>
-          </p:cNvPicPr>
-          <p:nvPr userDrawn="1"/>
-        </p:nvPicPr>
-        <p:blipFill>
-          <a:blip r:embed="rId17" cstate="print"/>
-          <a:stretch>
-            <a:fillRect/>
-          </a:stretch>
-        </p:blipFill>
-        <p:spPr>
-          <a:xfrm>
-            <a:off x="5508104" y="188640"/>
-            <a:ext cx="938825" cy="938825"/>
-          </a:xfrm>
-          <a:prstGeom prst="rect">
-            <a:avLst/>
-          </a:prstGeom>
-        </p:spPr>
-      </p:pic>
-      <p:pic>
-        <p:nvPicPr>
-          <p:cNvPr id="24" name="Picture 23" descr="compasswip.png"/>
-          <p:cNvPicPr>
-            <a:picLocks noChangeAspect="1"/>
-          </p:cNvPicPr>
-          <p:nvPr userDrawn="1"/>
-        </p:nvPicPr>
-        <p:blipFill>
-          <a:blip r:embed="rId18" cstate="print"/>
-          <a:stretch>
-            <a:fillRect/>
-          </a:stretch>
-        </p:blipFill>
-        <p:spPr>
-          <a:xfrm>
-            <a:off x="1763688" y="5703500"/>
-            <a:ext cx="1154500" cy="1154500"/>
-          </a:xfrm>
-          <a:prstGeom prst="rect">
-            <a:avLst/>
-          </a:prstGeom>
-        </p:spPr>
-      </p:pic>
-      <p:pic>
-        <p:nvPicPr>
-          <p:cNvPr id="25" name="Picture 24" descr="horseshoemagnet.png"/>
-          <p:cNvPicPr>
-            <a:picLocks noChangeAspect="1"/>
-          </p:cNvPicPr>
-          <p:nvPr userDrawn="1"/>
-        </p:nvPicPr>
-        <p:blipFill>
-          <a:blip r:embed="rId19" cstate="print"/>
-          <a:stretch>
-            <a:fillRect/>
-          </a:stretch>
-        </p:blipFill>
-        <p:spPr>
-          <a:xfrm>
             <a:off x="7380312" y="2492896"/>
             <a:ext cx="1559373" cy="1559373"/>
           </a:xfrm>
@@ -565,7 +469,7 @@
           <p:nvPr userDrawn="1"/>
         </p:nvPicPr>
         <p:blipFill>
-          <a:blip r:embed="rId20" cstate="print"/>
+          <a:blip r:embed="rId16" cstate="print"/>
           <a:stretch>
             <a:fillRect/>
           </a:stretch>
@@ -718,30 +622,7 @@
           <a:lstStyle/>
           <a:p>
             <a:pPr algn="ctr"/>
-            <a:r>
-              <a:rPr lang="en-US" sz="3000" b="1" dirty="0" smtClean="0">
-                <a:ln w="9525">
-                  <a:solidFill>
-                    <a:schemeClr val="bg1"/>
-                  </a:solidFill>
-                  <a:prstDash val="solid"/>
-                </a:ln>
-                <a:solidFill>
-                  <a:schemeClr val="accent2"/>
-                </a:solidFill>
-                <a:effectLst>
-                  <a:outerShdw blurRad="12700" dist="38100" dir="2700000" algn="tl" rotWithShape="0">
-                    <a:schemeClr val="accent5">
-                      <a:lumMod val="60000"/>
-                      <a:lumOff val="40000"/>
-                    </a:schemeClr>
-                  </a:outerShdw>
-                </a:effectLst>
-                <a:latin typeface="+mj-lt"/>
-              </a:rPr>
-              <a:t>Your Name</a:t>
-            </a:r>
-            <a:endParaRPr lang="en-US" sz="3000" b="1" dirty="0">
+            <a:endParaRPr lang="en-US" sz="3000" b="1" dirty="0" smtClean="0">
               <a:ln w="9525">
                 <a:solidFill>
                   <a:schemeClr val="bg1"/>
@@ -1537,6 +1418,102 @@
           </a:p>
         </p:txBody>
       </p:sp>
+      <p:pic>
+        <p:nvPicPr>
+          <p:cNvPr id="21" name="Picture 20" descr="greenballoon.png"/>
+          <p:cNvPicPr>
+            <a:picLocks noChangeAspect="1"/>
+          </p:cNvPicPr>
+          <p:nvPr userDrawn="1"/>
+        </p:nvPicPr>
+        <p:blipFill>
+          <a:blip r:embed="rId17" cstate="print"/>
+          <a:stretch>
+            <a:fillRect/>
+          </a:stretch>
+        </p:blipFill>
+        <p:spPr>
+          <a:xfrm>
+            <a:off x="2339752" y="116632"/>
+            <a:ext cx="1152128" cy="1152128"/>
+          </a:xfrm>
+          <a:prstGeom prst="rect">
+            <a:avLst/>
+          </a:prstGeom>
+        </p:spPr>
+      </p:pic>
+      <p:pic>
+        <p:nvPicPr>
+          <p:cNvPr id="19" name="Picture 18" descr="engine.png"/>
+          <p:cNvPicPr>
+            <a:picLocks noChangeAspect="1"/>
+          </p:cNvPicPr>
+          <p:nvPr userDrawn="1"/>
+        </p:nvPicPr>
+        <p:blipFill>
+          <a:blip r:embed="rId18" cstate="print"/>
+          <a:stretch>
+            <a:fillRect/>
+          </a:stretch>
+        </p:blipFill>
+        <p:spPr>
+          <a:xfrm>
+            <a:off x="3563888" y="0"/>
+            <a:ext cx="1872208" cy="936104"/>
+          </a:xfrm>
+          <a:prstGeom prst="rect">
+            <a:avLst/>
+          </a:prstGeom>
+        </p:spPr>
+      </p:pic>
+      <p:pic>
+        <p:nvPicPr>
+          <p:cNvPr id="23" name="Picture 22" descr="redballoon.png"/>
+          <p:cNvPicPr>
+            <a:picLocks noChangeAspect="1"/>
+          </p:cNvPicPr>
+          <p:nvPr userDrawn="1"/>
+        </p:nvPicPr>
+        <p:blipFill>
+          <a:blip r:embed="rId19" cstate="print"/>
+          <a:stretch>
+            <a:fillRect/>
+          </a:stretch>
+        </p:blipFill>
+        <p:spPr>
+          <a:xfrm>
+            <a:off x="5508104" y="188640"/>
+            <a:ext cx="938825" cy="938825"/>
+          </a:xfrm>
+          <a:prstGeom prst="rect">
+            <a:avLst/>
+          </a:prstGeom>
+        </p:spPr>
+      </p:pic>
+      <p:pic>
+        <p:nvPicPr>
+          <p:cNvPr id="12" name="Picture 11" descr="check.png"/>
+          <p:cNvPicPr>
+            <a:picLocks noChangeAspect="1"/>
+          </p:cNvPicPr>
+          <p:nvPr userDrawn="1"/>
+        </p:nvPicPr>
+        <p:blipFill>
+          <a:blip r:embed="rId20" cstate="print"/>
+          <a:stretch>
+            <a:fillRect/>
+          </a:stretch>
+        </p:blipFill>
+        <p:spPr>
+          <a:xfrm>
+            <a:off x="2627784" y="3356992"/>
+            <a:ext cx="812698" cy="812698"/>
+          </a:xfrm>
+          <a:prstGeom prst="rect">
+            <a:avLst/>
+          </a:prstGeom>
+        </p:spPr>
+      </p:pic>
     </p:spTree>
   </p:cSld>
   <p:clrMapOvr>
@@ -1654,7 +1631,8 @@
           <a:p>
             <a:fld id="{AECBF2E3-CEB7-41C6-ABBE-CD8BB7A9FEFC}" type="datetimeFigureOut">
               <a:rPr lang="en-US" smtClean="0"/>
-              <a:t>2/28/2013</a:t>
+              <a:pPr/>
+              <a:t>6/8/2013</a:t>
             </a:fld>
             <a:endParaRPr lang="en-US"/>
           </a:p>
@@ -1696,6 +1674,7 @@
           <a:p>
             <a:fld id="{AFF8CA9C-F077-49C5-830F-68E0951FA25C}" type="slidenum">
               <a:rPr lang="en-US" smtClean="0"/>
+              <a:pPr/>
               <a:t>‹#›</a:t>
             </a:fld>
             <a:endParaRPr lang="en-US"/>
@@ -1829,7 +1808,8 @@
           <a:p>
             <a:fld id="{AECBF2E3-CEB7-41C6-ABBE-CD8BB7A9FEFC}" type="datetimeFigureOut">
               <a:rPr lang="en-US" smtClean="0"/>
-              <a:t>2/28/2013</a:t>
+              <a:pPr/>
+              <a:t>6/8/2013</a:t>
             </a:fld>
             <a:endParaRPr lang="en-US"/>
           </a:p>
@@ -1871,6 +1851,7 @@
           <a:p>
             <a:fld id="{AFF8CA9C-F077-49C5-830F-68E0951FA25C}" type="slidenum">
               <a:rPr lang="en-US" smtClean="0"/>
+              <a:pPr/>
               <a:t>‹#›</a:t>
             </a:fld>
             <a:endParaRPr lang="en-US"/>
@@ -1994,7 +1975,8 @@
           <a:p>
             <a:fld id="{AECBF2E3-CEB7-41C6-ABBE-CD8BB7A9FEFC}" type="datetimeFigureOut">
               <a:rPr lang="en-US" smtClean="0"/>
-              <a:t>2/28/2013</a:t>
+              <a:pPr/>
+              <a:t>6/8/2013</a:t>
             </a:fld>
             <a:endParaRPr lang="en-US"/>
           </a:p>
@@ -2036,6 +2018,7 @@
           <a:p>
             <a:fld id="{AFF8CA9C-F077-49C5-830F-68E0951FA25C}" type="slidenum">
               <a:rPr lang="en-US" smtClean="0"/>
+              <a:pPr/>
               <a:t>‹#›</a:t>
             </a:fld>
             <a:endParaRPr lang="en-US"/>
@@ -2235,7 +2218,8 @@
           <a:p>
             <a:fld id="{AECBF2E3-CEB7-41C6-ABBE-CD8BB7A9FEFC}" type="datetimeFigureOut">
               <a:rPr lang="en-US" smtClean="0"/>
-              <a:t>2/28/2013</a:t>
+              <a:pPr/>
+              <a:t>6/8/2013</a:t>
             </a:fld>
             <a:endParaRPr lang="en-US"/>
           </a:p>
@@ -2277,6 +2261,7 @@
           <a:p>
             <a:fld id="{AFF8CA9C-F077-49C5-830F-68E0951FA25C}" type="slidenum">
               <a:rPr lang="en-US" smtClean="0"/>
+              <a:pPr/>
               <a:t>‹#›</a:t>
             </a:fld>
             <a:endParaRPr lang="en-US"/>
@@ -2518,7 +2503,8 @@
           <a:p>
             <a:fld id="{AECBF2E3-CEB7-41C6-ABBE-CD8BB7A9FEFC}" type="datetimeFigureOut">
               <a:rPr lang="en-US" smtClean="0"/>
-              <a:t>2/28/2013</a:t>
+              <a:pPr/>
+              <a:t>6/8/2013</a:t>
             </a:fld>
             <a:endParaRPr lang="en-US"/>
           </a:p>
@@ -2560,6 +2546,7 @@
           <a:p>
             <a:fld id="{AFF8CA9C-F077-49C5-830F-68E0951FA25C}" type="slidenum">
               <a:rPr lang="en-US" smtClean="0"/>
+              <a:pPr/>
               <a:t>‹#›</a:t>
             </a:fld>
             <a:endParaRPr lang="en-US"/>
@@ -2935,7 +2922,8 @@
           <a:p>
             <a:fld id="{AECBF2E3-CEB7-41C6-ABBE-CD8BB7A9FEFC}" type="datetimeFigureOut">
               <a:rPr lang="en-US" smtClean="0"/>
-              <a:t>2/28/2013</a:t>
+              <a:pPr/>
+              <a:t>6/8/2013</a:t>
             </a:fld>
             <a:endParaRPr lang="en-US"/>
           </a:p>
@@ -2977,6 +2965,7 @@
           <a:p>
             <a:fld id="{AFF8CA9C-F077-49C5-830F-68E0951FA25C}" type="slidenum">
               <a:rPr lang="en-US" smtClean="0"/>
+              <a:pPr/>
               <a:t>‹#›</a:t>
             </a:fld>
             <a:endParaRPr lang="en-US"/>
@@ -3048,7 +3037,8 @@
           <a:p>
             <a:fld id="{AECBF2E3-CEB7-41C6-ABBE-CD8BB7A9FEFC}" type="datetimeFigureOut">
               <a:rPr lang="en-US" smtClean="0"/>
-              <a:t>2/28/2013</a:t>
+              <a:pPr/>
+              <a:t>6/8/2013</a:t>
             </a:fld>
             <a:endParaRPr lang="en-US"/>
           </a:p>
@@ -3090,6 +3080,7 @@
           <a:p>
             <a:fld id="{AFF8CA9C-F077-49C5-830F-68E0951FA25C}" type="slidenum">
               <a:rPr lang="en-US" smtClean="0"/>
+              <a:pPr/>
               <a:t>‹#›</a:t>
             </a:fld>
             <a:endParaRPr lang="en-US"/>
@@ -3138,7 +3129,8 @@
           <a:p>
             <a:fld id="{AECBF2E3-CEB7-41C6-ABBE-CD8BB7A9FEFC}" type="datetimeFigureOut">
               <a:rPr lang="en-US" smtClean="0"/>
-              <a:t>2/28/2013</a:t>
+              <a:pPr/>
+              <a:t>6/8/2013</a:t>
             </a:fld>
             <a:endParaRPr lang="en-US"/>
           </a:p>
@@ -3180,6 +3172,7 @@
           <a:p>
             <a:fld id="{AFF8CA9C-F077-49C5-830F-68E0951FA25C}" type="slidenum">
               <a:rPr lang="en-US" smtClean="0"/>
+              <a:pPr/>
               <a:t>‹#›</a:t>
             </a:fld>
             <a:endParaRPr lang="en-US"/>
@@ -3410,7 +3403,8 @@
           <a:p>
             <a:fld id="{AECBF2E3-CEB7-41C6-ABBE-CD8BB7A9FEFC}" type="datetimeFigureOut">
               <a:rPr lang="en-US" smtClean="0"/>
-              <a:t>2/28/2013</a:t>
+              <a:pPr/>
+              <a:t>6/8/2013</a:t>
             </a:fld>
             <a:endParaRPr lang="en-US"/>
           </a:p>
@@ -3452,6 +3446,7 @@
           <a:p>
             <a:fld id="{AFF8CA9C-F077-49C5-830F-68E0951FA25C}" type="slidenum">
               <a:rPr lang="en-US" smtClean="0"/>
+              <a:pPr/>
               <a:t>‹#›</a:t>
             </a:fld>
             <a:endParaRPr lang="en-US"/>
@@ -3658,7 +3653,8 @@
           <a:p>
             <a:fld id="{AECBF2E3-CEB7-41C6-ABBE-CD8BB7A9FEFC}" type="datetimeFigureOut">
               <a:rPr lang="en-US" smtClean="0"/>
-              <a:t>2/28/2013</a:t>
+              <a:pPr/>
+              <a:t>6/8/2013</a:t>
             </a:fld>
             <a:endParaRPr lang="en-US"/>
           </a:p>
@@ -3700,6 +3696,7 @@
           <a:p>
             <a:fld id="{AFF8CA9C-F077-49C5-830F-68E0951FA25C}" type="slidenum">
               <a:rPr lang="en-US" smtClean="0"/>
+              <a:pPr/>
               <a:t>‹#›</a:t>
             </a:fld>
             <a:endParaRPr lang="en-US"/>
@@ -3866,7 +3863,8 @@
           <a:p>
             <a:fld id="{AECBF2E3-CEB7-41C6-ABBE-CD8BB7A9FEFC}" type="datetimeFigureOut">
               <a:rPr lang="en-US" smtClean="0"/>
-              <a:t>2/28/2013</a:t>
+              <a:pPr/>
+              <a:t>6/8/2013</a:t>
             </a:fld>
             <a:endParaRPr lang="en-US"/>
           </a:p>
@@ -3944,6 +3942,7 @@
           <a:p>
             <a:fld id="{AFF8CA9C-F077-49C5-830F-68E0951FA25C}" type="slidenum">
               <a:rPr lang="en-US" smtClean="0"/>
+              <a:pPr/>
               <a:t>‹#›</a:t>
             </a:fld>
             <a:endParaRPr lang="en-US"/>

</xml_diff>